<commit_message>
update the design section.
</commit_message>
<xml_diff>
--- a/Articles/3_BrowserUseWithDeepSeek/img/designDoc.pptx
+++ b/Articles/3_BrowserUseWithDeepSeek/img/designDoc.pptx
@@ -263,7 +263,7 @@
           <a:p>
             <a:fld id="{1DDE15A5-9415-4BDF-A2D9-2217B1E34822}" type="datetimeFigureOut">
               <a:rPr lang="en-SG" smtClean="0"/>
-              <a:t>16/3/2025</a:t>
+              <a:t>17/3/2025</a:t>
             </a:fld>
             <a:endParaRPr lang="en-SG"/>
           </a:p>
@@ -463,7 +463,7 @@
           <a:p>
             <a:fld id="{1DDE15A5-9415-4BDF-A2D9-2217B1E34822}" type="datetimeFigureOut">
               <a:rPr lang="en-SG" smtClean="0"/>
-              <a:t>16/3/2025</a:t>
+              <a:t>17/3/2025</a:t>
             </a:fld>
             <a:endParaRPr lang="en-SG"/>
           </a:p>
@@ -673,7 +673,7 @@
           <a:p>
             <a:fld id="{1DDE15A5-9415-4BDF-A2D9-2217B1E34822}" type="datetimeFigureOut">
               <a:rPr lang="en-SG" smtClean="0"/>
-              <a:t>16/3/2025</a:t>
+              <a:t>17/3/2025</a:t>
             </a:fld>
             <a:endParaRPr lang="en-SG"/>
           </a:p>
@@ -873,7 +873,7 @@
           <a:p>
             <a:fld id="{1DDE15A5-9415-4BDF-A2D9-2217B1E34822}" type="datetimeFigureOut">
               <a:rPr lang="en-SG" smtClean="0"/>
-              <a:t>16/3/2025</a:t>
+              <a:t>17/3/2025</a:t>
             </a:fld>
             <a:endParaRPr lang="en-SG"/>
           </a:p>
@@ -1149,7 +1149,7 @@
           <a:p>
             <a:fld id="{1DDE15A5-9415-4BDF-A2D9-2217B1E34822}" type="datetimeFigureOut">
               <a:rPr lang="en-SG" smtClean="0"/>
-              <a:t>16/3/2025</a:t>
+              <a:t>17/3/2025</a:t>
             </a:fld>
             <a:endParaRPr lang="en-SG"/>
           </a:p>
@@ -1417,7 +1417,7 @@
           <a:p>
             <a:fld id="{1DDE15A5-9415-4BDF-A2D9-2217B1E34822}" type="datetimeFigureOut">
               <a:rPr lang="en-SG" smtClean="0"/>
-              <a:t>16/3/2025</a:t>
+              <a:t>17/3/2025</a:t>
             </a:fld>
             <a:endParaRPr lang="en-SG"/>
           </a:p>
@@ -1832,7 +1832,7 @@
           <a:p>
             <a:fld id="{1DDE15A5-9415-4BDF-A2D9-2217B1E34822}" type="datetimeFigureOut">
               <a:rPr lang="en-SG" smtClean="0"/>
-              <a:t>16/3/2025</a:t>
+              <a:t>17/3/2025</a:t>
             </a:fld>
             <a:endParaRPr lang="en-SG"/>
           </a:p>
@@ -1974,7 +1974,7 @@
           <a:p>
             <a:fld id="{1DDE15A5-9415-4BDF-A2D9-2217B1E34822}" type="datetimeFigureOut">
               <a:rPr lang="en-SG" smtClean="0"/>
-              <a:t>16/3/2025</a:t>
+              <a:t>17/3/2025</a:t>
             </a:fld>
             <a:endParaRPr lang="en-SG"/>
           </a:p>
@@ -2087,7 +2087,7 @@
           <a:p>
             <a:fld id="{1DDE15A5-9415-4BDF-A2D9-2217B1E34822}" type="datetimeFigureOut">
               <a:rPr lang="en-SG" smtClean="0"/>
-              <a:t>16/3/2025</a:t>
+              <a:t>17/3/2025</a:t>
             </a:fld>
             <a:endParaRPr lang="en-SG"/>
           </a:p>
@@ -2400,7 +2400,7 @@
           <a:p>
             <a:fld id="{1DDE15A5-9415-4BDF-A2D9-2217B1E34822}" type="datetimeFigureOut">
               <a:rPr lang="en-SG" smtClean="0"/>
-              <a:t>16/3/2025</a:t>
+              <a:t>17/3/2025</a:t>
             </a:fld>
             <a:endParaRPr lang="en-SG"/>
           </a:p>
@@ -2689,7 +2689,7 @@
           <a:p>
             <a:fld id="{1DDE15A5-9415-4BDF-A2D9-2217B1E34822}" type="datetimeFigureOut">
               <a:rPr lang="en-SG" smtClean="0"/>
-              <a:t>16/3/2025</a:t>
+              <a:t>17/3/2025</a:t>
             </a:fld>
             <a:endParaRPr lang="en-SG"/>
           </a:p>
@@ -2932,7 +2932,7 @@
           <a:p>
             <a:fld id="{1DDE15A5-9415-4BDF-A2D9-2217B1E34822}" type="datetimeFigureOut">
               <a:rPr lang="en-SG" smtClean="0"/>
-              <a:t>16/3/2025</a:t>
+              <a:t>17/3/2025</a:t>
             </a:fld>
             <a:endParaRPr lang="en-SG"/>
           </a:p>

</xml_diff>